<commit_message>
Updated the presentation for Challenge 2
</commit_message>
<xml_diff>
--- a/Challenges/Satellite Image Data Set - Challenge 2/Ppt - Satellite Image Dataset Classification Challenge-2.pptx
+++ b/Challenges/Satellite Image Data Set - Challenge 2/Ppt - Satellite Image Dataset Classification Challenge-2.pptx
@@ -126,7 +126,7 @@
   </p:defaultTextStyle>
   <p:extLst>
     <p:ext uri="{EFAFB233-063F-42B5-8137-9DF3F51BA10A}">
-      <p15:sldGuideLst xmlns="" xmlns:p15="http://schemas.microsoft.com/office/powerpoint/2012/main">
+      <p15:sldGuideLst xmlns:p15="http://schemas.microsoft.com/office/powerpoint/2012/main" xmlns="">
         <p15:guide id="1" orient="horz" pos="2160">
           <p15:clr>
             <a:srgbClr val="A4A3A4"/>
@@ -1288,9 +1288,9 @@
     <dgm:cxn modelId="{5DAC065C-C3AF-49D4-8CFF-E205C750A92A}" type="presOf" srcId="{B3136396-617E-40DE-94E5-4419C0F89848}" destId="{E0F51D26-9C4E-46D9-B670-221DB66B1B1D}" srcOrd="0" destOrd="0" presId="urn:microsoft.com/office/officeart/2005/8/layout/process1"/>
     <dgm:cxn modelId="{B710CF99-B0AF-41C5-93AA-ABAA14EF22C7}" type="presOf" srcId="{63FA2AF9-2D10-497E-9157-EC44F4D7320C}" destId="{0C8C155F-305A-486E-B7B8-7C2CEF130136}" srcOrd="0" destOrd="0" presId="urn:microsoft.com/office/officeart/2005/8/layout/process1"/>
     <dgm:cxn modelId="{38CF61A1-B618-43E1-AFEE-7261E85E92B6}" type="presOf" srcId="{F79A40E6-9D47-4B3F-AAC2-1C27D05703B9}" destId="{FC52A0A9-3A7F-4474-A219-B62CDA5D0786}" srcOrd="0" destOrd="0" presId="urn:microsoft.com/office/officeart/2005/8/layout/process1"/>
-    <dgm:cxn modelId="{32C89380-DE10-4538-8904-3076ADF29E4A}" type="presOf" srcId="{29959815-D886-4B58-9DCB-51D7F54461E3}" destId="{5F423820-0B91-439E-A2AC-B466ADF028C1}" srcOrd="0" destOrd="0" presId="urn:microsoft.com/office/officeart/2005/8/layout/process1"/>
     <dgm:cxn modelId="{EAF7F4FD-8A96-499C-9F04-6B88ADE77E43}" type="presOf" srcId="{B3136396-617E-40DE-94E5-4419C0F89848}" destId="{C8B53646-9373-46A0-9B26-DC49EF75D4F3}" srcOrd="1" destOrd="0" presId="urn:microsoft.com/office/officeart/2005/8/layout/process1"/>
     <dgm:cxn modelId="{DB11EE60-E500-46C9-A55E-B2BEEFBA503B}" type="presOf" srcId="{63FA2AF9-2D10-497E-9157-EC44F4D7320C}" destId="{14F3C660-67D7-400F-8E84-3223E5633361}" srcOrd="1" destOrd="0" presId="urn:microsoft.com/office/officeart/2005/8/layout/process1"/>
+    <dgm:cxn modelId="{32C89380-DE10-4538-8904-3076ADF29E4A}" type="presOf" srcId="{29959815-D886-4B58-9DCB-51D7F54461E3}" destId="{5F423820-0B91-439E-A2AC-B466ADF028C1}" srcOrd="0" destOrd="0" presId="urn:microsoft.com/office/officeart/2005/8/layout/process1"/>
     <dgm:cxn modelId="{72C57326-4377-4842-91B2-38017920D375}" type="presParOf" srcId="{6281DDB5-E61D-4DA4-9045-051E963ECEA9}" destId="{5F423820-0B91-439E-A2AC-B466ADF028C1}" srcOrd="0" destOrd="0" presId="urn:microsoft.com/office/officeart/2005/8/layout/process1"/>
     <dgm:cxn modelId="{D3F0008F-3881-4A2E-BBC8-3E0C48C362DE}" type="presParOf" srcId="{6281DDB5-E61D-4DA4-9045-051E963ECEA9}" destId="{0C8C155F-305A-486E-B7B8-7C2CEF130136}" srcOrd="1" destOrd="0" presId="urn:microsoft.com/office/officeart/2005/8/layout/process1"/>
     <dgm:cxn modelId="{77066002-99FE-4580-B609-E0F12F701300}" type="presParOf" srcId="{0C8C155F-305A-486E-B7B8-7C2CEF130136}" destId="{14F3C660-67D7-400F-8E84-3223E5633361}" srcOrd="0" destOrd="0" presId="urn:microsoft.com/office/officeart/2005/8/layout/process1"/>
@@ -2960,7 +2960,7 @@
           <a:p>
             <a:fld id="{E4A335C6-5413-4BFE-A0EC-ECCE8B4A9B1D}" type="datetimeFigureOut">
               <a:rPr lang="en-IN" smtClean="0"/>
-              <a:t>29-11-2015</a:t>
+              <a:t>30-11-2015</a:t>
             </a:fld>
             <a:endParaRPr lang="en-IN"/>
           </a:p>
@@ -3134,7 +3134,7 @@
           <a:p>
             <a:fld id="{119CFE3F-2E79-4A1F-823C-3153EDB78A8C}" type="datetimeFigureOut">
               <a:rPr lang="en-IN" smtClean="0"/>
-              <a:t>29-11-2015</a:t>
+              <a:t>30-11-2015</a:t>
             </a:fld>
             <a:endParaRPr lang="en-IN"/>
           </a:p>
@@ -3939,7 +3939,7 @@
           <a:p>
             <a:fld id="{12C66A5D-3DFF-4AFE-9026-8E1225C6223B}" type="datetime1">
               <a:rPr lang="en-IN" smtClean="0"/>
-              <a:t>29-11-2015</a:t>
+              <a:t>30-11-2015</a:t>
             </a:fld>
             <a:endParaRPr lang="en-IN"/>
           </a:p>
@@ -4003,7 +4003,7 @@
   </p:clrMapOvr>
   <p:extLst mod="1">
     <p:ext uri="{DCECCB84-F9BA-43D5-87BE-67443E8EF086}">
-      <p15:sldGuideLst xmlns="" xmlns:p15="http://schemas.microsoft.com/office/powerpoint/2012/main"/>
+      <p15:sldGuideLst xmlns:p15="http://schemas.microsoft.com/office/powerpoint/2012/main" xmlns=""/>
     </p:ext>
   </p:extLst>
 </p:sldLayout>
@@ -4118,7 +4118,7 @@
           <a:p>
             <a:fld id="{E0AC8EB1-FA30-4F77-9D37-E599F78FD528}" type="datetime1">
               <a:rPr lang="en-IN" smtClean="0"/>
-              <a:t>29-11-2015</a:t>
+              <a:t>30-11-2015</a:t>
             </a:fld>
             <a:endParaRPr lang="en-IN"/>
           </a:p>
@@ -4302,7 +4302,7 @@
           <a:p>
             <a:fld id="{16720B39-5616-4A4F-9CDA-9C81C46A2459}" type="datetime1">
               <a:rPr lang="en-IN" smtClean="0"/>
-              <a:t>29-11-2015</a:t>
+              <a:t>30-11-2015</a:t>
             </a:fld>
             <a:endParaRPr lang="en-IN"/>
           </a:p>
@@ -4366,7 +4366,7 @@
   </p:clrMapOvr>
   <p:extLst mod="1">
     <p:ext uri="{DCECCB84-F9BA-43D5-87BE-67443E8EF086}">
-      <p15:sldGuideLst xmlns="" xmlns:p15="http://schemas.microsoft.com/office/powerpoint/2012/main"/>
+      <p15:sldGuideLst xmlns:p15="http://schemas.microsoft.com/office/powerpoint/2012/main" xmlns=""/>
     </p:ext>
   </p:extLst>
 </p:sldLayout>
@@ -4514,7 +4514,7 @@
           <a:p>
             <a:fld id="{26A808B9-1D6E-4B4C-879B-01BE794C9262}" type="datetime1">
               <a:rPr lang="en-IN" smtClean="0"/>
-              <a:t>29-11-2015</a:t>
+              <a:t>30-11-2015</a:t>
             </a:fld>
             <a:endParaRPr lang="en-IN"/>
           </a:p>
@@ -4578,7 +4578,7 @@
   </p:clrMapOvr>
   <p:extLst mod="1">
     <p:ext uri="{DCECCB84-F9BA-43D5-87BE-67443E8EF086}">
-      <p15:sldGuideLst xmlns="" xmlns:p15="http://schemas.microsoft.com/office/powerpoint/2012/main"/>
+      <p15:sldGuideLst xmlns:p15="http://schemas.microsoft.com/office/powerpoint/2012/main" xmlns=""/>
     </p:ext>
   </p:extLst>
 </p:sldLayout>
@@ -4693,7 +4693,7 @@
           <a:p>
             <a:fld id="{06C36FEA-6D7D-40C6-9DE4-228CC1D8D95E}" type="datetime1">
               <a:rPr lang="en-IN" smtClean="0"/>
-              <a:t>29-11-2015</a:t>
+              <a:t>30-11-2015</a:t>
             </a:fld>
             <a:endParaRPr lang="en-IN"/>
           </a:p>
@@ -4948,7 +4948,7 @@
           <a:p>
             <a:fld id="{091971B1-0A71-4B10-B8A9-A42D28497347}" type="datetime1">
               <a:rPr lang="en-IN" smtClean="0"/>
-              <a:t>29-11-2015</a:t>
+              <a:t>30-11-2015</a:t>
             </a:fld>
             <a:endParaRPr lang="en-IN"/>
           </a:p>
@@ -5012,7 +5012,7 @@
   </p:clrMapOvr>
   <p:extLst mod="1">
     <p:ext uri="{DCECCB84-F9BA-43D5-87BE-67443E8EF086}">
-      <p15:sldGuideLst xmlns="" xmlns:p15="http://schemas.microsoft.com/office/powerpoint/2012/main"/>
+      <p15:sldGuideLst xmlns:p15="http://schemas.microsoft.com/office/powerpoint/2012/main" xmlns=""/>
     </p:ext>
   </p:extLst>
 </p:sldLayout>
@@ -5189,7 +5189,7 @@
           <a:p>
             <a:fld id="{DBE49506-2FC6-462E-B394-0FA1DFF3C63D}" type="datetime1">
               <a:rPr lang="en-IN" smtClean="0"/>
-              <a:t>29-11-2015</a:t>
+              <a:t>30-11-2015</a:t>
             </a:fld>
             <a:endParaRPr lang="en-IN"/>
           </a:p>
@@ -5253,7 +5253,7 @@
   </p:clrMapOvr>
   <p:extLst mod="1">
     <p:ext uri="{DCECCB84-F9BA-43D5-87BE-67443E8EF086}">
-      <p15:sldGuideLst xmlns="" xmlns:p15="http://schemas.microsoft.com/office/powerpoint/2012/main"/>
+      <p15:sldGuideLst xmlns:p15="http://schemas.microsoft.com/office/powerpoint/2012/main" xmlns=""/>
     </p:ext>
   </p:extLst>
 </p:sldLayout>
@@ -5545,7 +5545,7 @@
           <a:p>
             <a:fld id="{1C00E727-BB43-4B7F-945C-570AEA4ED059}" type="datetime1">
               <a:rPr lang="en-IN" smtClean="0"/>
-              <a:t>29-11-2015</a:t>
+              <a:t>30-11-2015</a:t>
             </a:fld>
             <a:endParaRPr lang="en-IN"/>
           </a:p>
@@ -5632,7 +5632,7 @@
   </p:clrMapOvr>
   <p:extLst mod="1">
     <p:ext uri="{DCECCB84-F9BA-43D5-87BE-67443E8EF086}">
-      <p15:sldGuideLst xmlns="" xmlns:p15="http://schemas.microsoft.com/office/powerpoint/2012/main"/>
+      <p15:sldGuideLst xmlns:p15="http://schemas.microsoft.com/office/powerpoint/2012/main" xmlns=""/>
     </p:ext>
   </p:extLst>
 </p:sldLayout>
@@ -5672,7 +5672,7 @@
           <a:p>
             <a:fld id="{CB7318A5-BDA4-436C-B7B5-5AC39E867B8E}" type="datetime1">
               <a:rPr lang="en-IN" smtClean="0"/>
-              <a:t>29-11-2015</a:t>
+              <a:t>30-11-2015</a:t>
             </a:fld>
             <a:endParaRPr lang="en-IN"/>
           </a:p>
@@ -5794,7 +5794,7 @@
           <a:p>
             <a:fld id="{E82BB7D3-3793-466E-96A5-9C947B5DD731}" type="datetime1">
               <a:rPr lang="en-IN" smtClean="0"/>
-              <a:t>29-11-2015</a:t>
+              <a:t>30-11-2015</a:t>
             </a:fld>
             <a:endParaRPr lang="en-IN"/>
           </a:p>
@@ -5858,7 +5858,7 @@
   </p:clrMapOvr>
   <p:extLst mod="1">
     <p:ext uri="{DCECCB84-F9BA-43D5-87BE-67443E8EF086}">
-      <p15:sldGuideLst xmlns="" xmlns:p15="http://schemas.microsoft.com/office/powerpoint/2012/main"/>
+      <p15:sldGuideLst xmlns:p15="http://schemas.microsoft.com/office/powerpoint/2012/main" xmlns=""/>
     </p:ext>
   </p:extLst>
 </p:sldLayout>
@@ -6087,7 +6087,7 @@
           <a:p>
             <a:fld id="{2CF69443-A9A2-4351-BCB3-3C0B130AB69F}" type="datetime1">
               <a:rPr lang="en-IN" smtClean="0"/>
-              <a:t>29-11-2015</a:t>
+              <a:t>30-11-2015</a:t>
             </a:fld>
             <a:endParaRPr lang="en-IN"/>
           </a:p>
@@ -6151,7 +6151,7 @@
   </p:clrMapOvr>
   <p:extLst mod="1">
     <p:ext uri="{DCECCB84-F9BA-43D5-87BE-67443E8EF086}">
-      <p15:sldGuideLst xmlns="" xmlns:p15="http://schemas.microsoft.com/office/powerpoint/2012/main"/>
+      <p15:sldGuideLst xmlns:p15="http://schemas.microsoft.com/office/powerpoint/2012/main" xmlns=""/>
     </p:ext>
   </p:extLst>
 </p:sldLayout>
@@ -6266,7 +6266,7 @@
           <a:p>
             <a:fld id="{19DAF990-41B6-4F96-A6AE-AECC2BE3D03E}" type="datetime1">
               <a:rPr lang="en-IN" smtClean="0"/>
-              <a:t>29-11-2015</a:t>
+              <a:t>30-11-2015</a:t>
             </a:fld>
             <a:endParaRPr lang="en-IN"/>
           </a:p>
@@ -6534,7 +6534,7 @@
           <a:p>
             <a:fld id="{9F65E42A-F84B-470A-AD70-61D3FC862409}" type="datetime1">
               <a:rPr lang="en-IN" smtClean="0"/>
-              <a:t>29-11-2015</a:t>
+              <a:t>30-11-2015</a:t>
             </a:fld>
             <a:endParaRPr lang="en-IN"/>
           </a:p>
@@ -6708,7 +6708,7 @@
           <a:p>
             <a:fld id="{EC87DC0B-6C8B-4640-B719-A50A4316887D}" type="datetime1">
               <a:rPr lang="en-IN" smtClean="0"/>
-              <a:t>29-11-2015</a:t>
+              <a:t>30-11-2015</a:t>
             </a:fld>
             <a:endParaRPr lang="en-IN"/>
           </a:p>
@@ -6892,7 +6892,7 @@
           <a:p>
             <a:fld id="{347D4913-C17D-4966-B44E-2A5A2C18460D}" type="datetime1">
               <a:rPr lang="en-IN" smtClean="0"/>
-              <a:t>29-11-2015</a:t>
+              <a:t>30-11-2015</a:t>
             </a:fld>
             <a:endParaRPr lang="en-IN"/>
           </a:p>
@@ -6956,7 +6956,7 @@
   </p:clrMapOvr>
   <p:extLst mod="1">
     <p:ext uri="{DCECCB84-F9BA-43D5-87BE-67443E8EF086}">
-      <p15:sldGuideLst xmlns="" xmlns:p15="http://schemas.microsoft.com/office/powerpoint/2012/main"/>
+      <p15:sldGuideLst xmlns:p15="http://schemas.microsoft.com/office/powerpoint/2012/main" xmlns=""/>
     </p:ext>
   </p:extLst>
 </p:sldLayout>
@@ -7595,7 +7595,7 @@
           <a:p>
             <a:fld id="{930DC8BE-FE27-4663-8911-B24A320A1000}" type="datetime1">
               <a:rPr lang="en-IN" smtClean="0"/>
-              <a:t>29-11-2015</a:t>
+              <a:t>30-11-2015</a:t>
             </a:fld>
             <a:endParaRPr lang="en-IN"/>
           </a:p>
@@ -7722,7 +7722,7 @@
   </p:clrMapOvr>
   <p:extLst mod="1">
     <p:ext uri="{DCECCB84-F9BA-43D5-87BE-67443E8EF086}">
-      <p15:sldGuideLst xmlns="" xmlns:p15="http://schemas.microsoft.com/office/powerpoint/2012/main"/>
+      <p15:sldGuideLst xmlns:p15="http://schemas.microsoft.com/office/powerpoint/2012/main" xmlns=""/>
     </p:ext>
   </p:extLst>
 </p:sldLayout>
@@ -7846,7 +7846,7 @@
           <a:p>
             <a:fld id="{6FAA12D3-ABBD-4F30-9BF4-3C1057EA890E}" type="datetime1">
               <a:rPr lang="en-IN" smtClean="0"/>
-              <a:t>29-11-2015</a:t>
+              <a:t>30-11-2015</a:t>
             </a:fld>
             <a:endParaRPr lang="en-IN"/>
           </a:p>
@@ -8861,7 +8861,7 @@
           <a:p>
             <a:fld id="{40322064-5E7B-4210-A836-25D1EC3EB4D5}" type="datetime1">
               <a:rPr lang="en-IN" smtClean="0"/>
-              <a:t>29-11-2015</a:t>
+              <a:t>30-11-2015</a:t>
             </a:fld>
             <a:endParaRPr lang="en-IN"/>
           </a:p>
@@ -8973,7 +8973,7 @@
   </p:clrMapOvr>
   <p:extLst mod="1">
     <p:ext uri="{DCECCB84-F9BA-43D5-87BE-67443E8EF086}">
-      <p15:sldGuideLst xmlns="" xmlns:p15="http://schemas.microsoft.com/office/powerpoint/2012/main"/>
+      <p15:sldGuideLst xmlns:p15="http://schemas.microsoft.com/office/powerpoint/2012/main" xmlns=""/>
     </p:ext>
   </p:extLst>
 </p:sldLayout>
@@ -9154,7 +9154,7 @@
           <a:p>
             <a:fld id="{9DFEE1F0-25A5-454A-99A1-7917620F9E92}" type="datetime1">
               <a:rPr lang="en-IN" smtClean="0"/>
-              <a:t>29-11-2015</a:t>
+              <a:t>30-11-2015</a:t>
             </a:fld>
             <a:endParaRPr lang="en-IN"/>
           </a:p>
@@ -9230,7 +9230,7 @@
   </p:clrMapOvr>
   <p:extLst mod="1">
     <p:ext uri="{DCECCB84-F9BA-43D5-87BE-67443E8EF086}">
-      <p15:sldGuideLst xmlns="" xmlns:p15="http://schemas.microsoft.com/office/powerpoint/2012/main"/>
+      <p15:sldGuideLst xmlns:p15="http://schemas.microsoft.com/office/powerpoint/2012/main" xmlns=""/>
     </p:ext>
   </p:extLst>
 </p:sldLayout>
@@ -9563,7 +9563,7 @@
           <a:p>
             <a:fld id="{EA59078A-671C-4D82-B53C-03E4A8EE5819}" type="datetime1">
               <a:rPr lang="en-IN" smtClean="0"/>
-              <a:t>29-11-2015</a:t>
+              <a:t>30-11-2015</a:t>
             </a:fld>
             <a:endParaRPr lang="en-IN"/>
           </a:p>
@@ -9639,7 +9639,7 @@
   </p:clrMapOvr>
   <p:extLst mod="1">
     <p:ext uri="{DCECCB84-F9BA-43D5-87BE-67443E8EF086}">
-      <p15:sldGuideLst xmlns="" xmlns:p15="http://schemas.microsoft.com/office/powerpoint/2012/main"/>
+      <p15:sldGuideLst xmlns:p15="http://schemas.microsoft.com/office/powerpoint/2012/main" xmlns=""/>
     </p:ext>
   </p:extLst>
 </p:sldLayout>
@@ -9702,7 +9702,7 @@
           <a:p>
             <a:fld id="{E898D8EE-9D0B-43CD-8E01-EC4F827AF67C}" type="datetime1">
               <a:rPr lang="en-IN" smtClean="0"/>
-              <a:t>29-11-2015</a:t>
+              <a:t>30-11-2015</a:t>
             </a:fld>
             <a:endParaRPr lang="en-IN"/>
           </a:p>
@@ -9849,7 +9849,7 @@
           <a:p>
             <a:fld id="{E4E1097E-BF89-4B96-AF4C-89AD481FB530}" type="datetime1">
               <a:rPr lang="en-IN" smtClean="0"/>
-              <a:t>29-11-2015</a:t>
+              <a:t>30-11-2015</a:t>
             </a:fld>
             <a:endParaRPr lang="en-IN"/>
           </a:p>
@@ -10116,7 +10116,7 @@
           <a:p>
             <a:fld id="{15646D05-00DE-4542-8E89-6953C5EA2BD9}" type="datetime1">
               <a:rPr lang="en-IN" smtClean="0"/>
-              <a:t>29-11-2015</a:t>
+              <a:t>30-11-2015</a:t>
             </a:fld>
             <a:endParaRPr lang="en-IN"/>
           </a:p>
@@ -10180,7 +10180,7 @@
   </p:clrMapOvr>
   <p:extLst mod="1">
     <p:ext uri="{DCECCB84-F9BA-43D5-87BE-67443E8EF086}">
-      <p15:sldGuideLst xmlns="" xmlns:p15="http://schemas.microsoft.com/office/powerpoint/2012/main"/>
+      <p15:sldGuideLst xmlns:p15="http://schemas.microsoft.com/office/powerpoint/2012/main" xmlns=""/>
     </p:ext>
   </p:extLst>
 </p:sldLayout>
@@ -11135,7 +11135,7 @@
           <a:p>
             <a:fld id="{20367747-FE0C-4DE9-8255-9FE0C5319A8C}" type="datetime1">
               <a:rPr lang="en-IN" smtClean="0"/>
-              <a:t>29-11-2015</a:t>
+              <a:t>30-11-2015</a:t>
             </a:fld>
             <a:endParaRPr lang="en-IN"/>
           </a:p>
@@ -11247,7 +11247,7 @@
   </p:clrMapOvr>
   <p:extLst mod="1">
     <p:ext uri="{DCECCB84-F9BA-43D5-87BE-67443E8EF086}">
-      <p15:sldGuideLst xmlns="" xmlns:p15="http://schemas.microsoft.com/office/powerpoint/2012/main"/>
+      <p15:sldGuideLst xmlns:p15="http://schemas.microsoft.com/office/powerpoint/2012/main" xmlns=""/>
     </p:ext>
   </p:extLst>
 </p:sldLayout>
@@ -12226,7 +12226,7 @@
           <a:p>
             <a:fld id="{971A836C-7772-46A4-8EB8-E2BC74AD39B2}" type="datetime1">
               <a:rPr lang="en-IN" smtClean="0"/>
-              <a:t>29-11-2015</a:t>
+              <a:t>30-11-2015</a:t>
             </a:fld>
             <a:endParaRPr lang="en-IN"/>
           </a:p>
@@ -13316,7 +13316,7 @@
           <a:p>
             <a:fld id="{F9656052-CB00-4357-A3A5-A5DD5207805B}" type="datetime1">
               <a:rPr lang="en-IN" smtClean="0"/>
-              <a:t>29-11-2015</a:t>
+              <a:t>30-11-2015</a:t>
             </a:fld>
             <a:endParaRPr lang="en-IN"/>
           </a:p>
@@ -14318,7 +14318,7 @@
           <a:p>
             <a:fld id="{DF4815E6-7FAA-4711-B4C0-121730BE24BF}" type="datetime1">
               <a:rPr lang="en-IN" smtClean="0"/>
-              <a:t>29-11-2015</a:t>
+              <a:t>30-11-2015</a:t>
             </a:fld>
             <a:endParaRPr lang="en-IN"/>
           </a:p>
@@ -15437,7 +15437,7 @@
           <a:p>
             <a:fld id="{F3214B7E-85CA-4196-8BE6-C49713C166C9}" type="datetime1">
               <a:rPr lang="en-IN" smtClean="0"/>
-              <a:t>29-11-2015</a:t>
+              <a:t>30-11-2015</a:t>
             </a:fld>
             <a:endParaRPr lang="en-IN"/>
           </a:p>
@@ -16455,7 +16455,7 @@
           <a:p>
             <a:fld id="{727B6EAF-1404-4E47-8EED-DAF9CF44B791}" type="datetime1">
               <a:rPr lang="en-IN" smtClean="0"/>
-              <a:t>29-11-2015</a:t>
+              <a:t>30-11-2015</a:t>
             </a:fld>
             <a:endParaRPr lang="en-IN"/>
           </a:p>
@@ -17131,7 +17131,7 @@
           <a:p>
             <a:fld id="{AA5A2D75-ADF5-4AB7-8803-EC2ABB260EA0}" type="datetime1">
               <a:rPr lang="en-IN" smtClean="0"/>
-              <a:t>29-11-2015</a:t>
+              <a:t>30-11-2015</a:t>
             </a:fld>
             <a:endParaRPr lang="en-IN"/>
           </a:p>
@@ -18008,7 +18008,7 @@
           <a:p>
             <a:fld id="{193DF214-1D4A-4B8B-A8E9-7779296A21F2}" type="datetime1">
               <a:rPr lang="en-IN" smtClean="0"/>
-              <a:t>29-11-2015</a:t>
+              <a:t>30-11-2015</a:t>
             </a:fld>
             <a:endParaRPr lang="en-IN"/>
           </a:p>
@@ -18199,7 +18199,7 @@
           <a:p>
             <a:fld id="{D8C6FFCB-1085-48B0-82C4-F8C4320F36CA}" type="datetime1">
               <a:rPr lang="en-IN" smtClean="0"/>
-              <a:t>29-11-2015</a:t>
+              <a:t>30-11-2015</a:t>
             </a:fld>
             <a:endParaRPr lang="en-IN"/>
           </a:p>
@@ -19152,7 +19152,7 @@
           <a:p>
             <a:fld id="{CD25C87E-21F4-4AF7-962C-2068630AC125}" type="datetime1">
               <a:rPr lang="en-IN" smtClean="0"/>
-              <a:t>29-11-2015</a:t>
+              <a:t>30-11-2015</a:t>
             </a:fld>
             <a:endParaRPr lang="en-IN"/>
           </a:p>
@@ -19269,7 +19269,7 @@
   </p:clrMapOvr>
   <p:extLst mod="1">
     <p:ext uri="{DCECCB84-F9BA-43D5-87BE-67443E8EF086}">
-      <p15:sldGuideLst xmlns="" xmlns:p15="http://schemas.microsoft.com/office/powerpoint/2012/main"/>
+      <p15:sldGuideLst xmlns:p15="http://schemas.microsoft.com/office/powerpoint/2012/main" xmlns=""/>
     </p:ext>
   </p:extLst>
 </p:sldLayout>
@@ -19446,7 +19446,7 @@
           <a:p>
             <a:fld id="{6741FE57-8089-434E-8EA9-F9925D1B552A}" type="datetime1">
               <a:rPr lang="en-IN" smtClean="0"/>
-              <a:t>29-11-2015</a:t>
+              <a:t>30-11-2015</a:t>
             </a:fld>
             <a:endParaRPr lang="en-IN"/>
           </a:p>
@@ -19510,7 +19510,7 @@
   </p:clrMapOvr>
   <p:extLst mod="1">
     <p:ext uri="{DCECCB84-F9BA-43D5-87BE-67443E8EF086}">
-      <p15:sldGuideLst xmlns="" xmlns:p15="http://schemas.microsoft.com/office/powerpoint/2012/main"/>
+      <p15:sldGuideLst xmlns:p15="http://schemas.microsoft.com/office/powerpoint/2012/main" xmlns=""/>
     </p:ext>
   </p:extLst>
 </p:sldLayout>
@@ -19802,7 +19802,7 @@
           <a:p>
             <a:fld id="{57544814-1A3F-45F9-8688-36234A300D32}" type="datetime1">
               <a:rPr lang="en-IN" smtClean="0"/>
-              <a:t>29-11-2015</a:t>
+              <a:t>30-11-2015</a:t>
             </a:fld>
             <a:endParaRPr lang="en-IN"/>
           </a:p>
@@ -19889,7 +19889,7 @@
   </p:clrMapOvr>
   <p:extLst mod="1">
     <p:ext uri="{DCECCB84-F9BA-43D5-87BE-67443E8EF086}">
-      <p15:sldGuideLst xmlns="" xmlns:p15="http://schemas.microsoft.com/office/powerpoint/2012/main"/>
+      <p15:sldGuideLst xmlns:p15="http://schemas.microsoft.com/office/powerpoint/2012/main" xmlns=""/>
     </p:ext>
   </p:extLst>
 </p:sldLayout>
@@ -19929,7 +19929,7 @@
           <a:p>
             <a:fld id="{7DBA756D-FEBE-4F7B-ADFE-68BC598B5FB8}" type="datetime1">
               <a:rPr lang="en-IN" smtClean="0"/>
-              <a:t>29-11-2015</a:t>
+              <a:t>30-11-2015</a:t>
             </a:fld>
             <a:endParaRPr lang="en-IN"/>
           </a:p>
@@ -20051,7 +20051,7 @@
           <a:p>
             <a:fld id="{B852E9F3-4C91-45BD-9CDC-96B8889EDB03}" type="datetime1">
               <a:rPr lang="en-IN" smtClean="0"/>
-              <a:t>29-11-2015</a:t>
+              <a:t>30-11-2015</a:t>
             </a:fld>
             <a:endParaRPr lang="en-IN"/>
           </a:p>
@@ -20339,7 +20339,7 @@
           <a:p>
             <a:fld id="{E13FFA93-96B3-4FD0-A7EC-300BEF5F9A99}" type="datetime1">
               <a:rPr lang="en-IN" smtClean="0"/>
-              <a:t>29-11-2015</a:t>
+              <a:t>30-11-2015</a:t>
             </a:fld>
             <a:endParaRPr lang="en-IN"/>
           </a:p>
@@ -20403,7 +20403,7 @@
   </p:clrMapOvr>
   <p:extLst mod="1">
     <p:ext uri="{DCECCB84-F9BA-43D5-87BE-67443E8EF086}">
-      <p15:sldGuideLst xmlns="" xmlns:p15="http://schemas.microsoft.com/office/powerpoint/2012/main"/>
+      <p15:sldGuideLst xmlns:p15="http://schemas.microsoft.com/office/powerpoint/2012/main" xmlns=""/>
     </p:ext>
   </p:extLst>
 </p:sldLayout>
@@ -20612,7 +20612,7 @@
           <a:p>
             <a:fld id="{8B8DF21F-F9F9-43D0-B7B7-A7B045AD4A05}" type="datetime1">
               <a:rPr lang="en-IN" smtClean="0"/>
-              <a:t>29-11-2015</a:t>
+              <a:t>30-11-2015</a:t>
             </a:fld>
             <a:endParaRPr lang="en-IN"/>
           </a:p>
@@ -20830,7 +20830,7 @@
           <a:p>
             <a:fld id="{EDAA4FD8-5B3B-4661-8AD7-3EBBBC3E8CC1}" type="datetime1">
               <a:rPr lang="en-IN" smtClean="0"/>
-              <a:t>29-11-2015</a:t>
+              <a:t>30-11-2015</a:t>
             </a:fld>
             <a:endParaRPr lang="en-IN"/>
           </a:p>
@@ -21211,7 +21211,7 @@
   </p:txStyles>
   <p:extLst mod="1">
     <p:ext uri="{27BBF7A9-308A-43DC-89C8-2F10F3537804}">
-      <p15:sldGuideLst xmlns="" xmlns:p15="http://schemas.microsoft.com/office/powerpoint/2012/main"/>
+      <p15:sldGuideLst xmlns:p15="http://schemas.microsoft.com/office/powerpoint/2012/main" xmlns=""/>
     </p:ext>
   </p:extLst>
 </p:sldMaster>
@@ -21370,7 +21370,7 @@
           <a:p>
             <a:fld id="{57531EEE-C07F-4A8D-9D1D-E47AC10E1DA1}" type="datetime1">
               <a:rPr lang="en-IN" smtClean="0"/>
-              <a:t>29-11-2015</a:t>
+              <a:t>30-11-2015</a:t>
             </a:fld>
             <a:endParaRPr lang="en-IN"/>
           </a:p>
@@ -21751,7 +21751,7 @@
   </p:txStyles>
   <p:extLst mod="1">
     <p:ext uri="{27BBF7A9-308A-43DC-89C8-2F10F3537804}">
-      <p15:sldGuideLst xmlns="" xmlns:p15="http://schemas.microsoft.com/office/powerpoint/2012/main"/>
+      <p15:sldGuideLst xmlns:p15="http://schemas.microsoft.com/office/powerpoint/2012/main" xmlns=""/>
     </p:ext>
   </p:extLst>
 </p:sldMaster>
@@ -22622,7 +22622,7 @@
           <a:p>
             <a:fld id="{52C8D5B6-01B0-4080-B087-EE664ADE7A28}" type="datetime1">
               <a:rPr lang="en-IN" smtClean="0"/>
-              <a:t>29-11-2015</a:t>
+              <a:t>30-11-2015</a:t>
             </a:fld>
             <a:endParaRPr lang="en-IN"/>
           </a:p>
@@ -23168,7 +23168,7 @@
   </p:txStyles>
   <p:extLst mod="1">
     <p:ext uri="{27BBF7A9-308A-43DC-89C8-2F10F3537804}">
-      <p15:sldGuideLst xmlns="" xmlns:p15="http://schemas.microsoft.com/office/powerpoint/2012/main"/>
+      <p15:sldGuideLst xmlns:p15="http://schemas.microsoft.com/office/powerpoint/2012/main" xmlns=""/>
     </p:ext>
   </p:extLst>
 </p:sldMaster>
@@ -23676,7 +23676,7 @@
             <p:ph idx="1"/>
             <p:extLst>
               <p:ext uri="{D42A27DB-BD31-4B8C-83A1-F6EECF244321}">
-                <p14:modId xmlns:p14="http://schemas.microsoft.com/office/powerpoint/2010/main" val="390819237"/>
+                <p14:modId xmlns:p14="http://schemas.microsoft.com/office/powerpoint/2010/main" val="4022525746"/>
               </p:ext>
             </p:extLst>
           </p:nvPr>
@@ -23828,7 +23828,19 @@
                     <a:lstStyle/>
                     <a:p>
                       <a:pPr algn="r"/>
-                      <a:endParaRPr lang="en-IN" sz="1400" dirty="0"/>
+                      <a:r>
+                        <a:rPr lang="en-IN" sz="1400" b="1" i="0" kern="1200" dirty="0" smtClean="0">
+                          <a:solidFill>
+                            <a:schemeClr val="dk1"/>
+                          </a:solidFill>
+                          <a:effectLst/>
+                          <a:latin typeface="+mn-lt"/>
+                          <a:ea typeface="+mn-ea"/>
+                          <a:cs typeface="+mn-cs"/>
+                        </a:rPr>
+                        <a:t>0.92100</a:t>
+                      </a:r>
+                      <a:endParaRPr lang="en-IN" sz="1400" b="1" dirty="0"/>
                     </a:p>
                   </a:txBody>
                   <a:tcPr/>
@@ -23908,7 +23920,19 @@
                     <a:lstStyle/>
                     <a:p>
                       <a:pPr algn="r"/>
-                      <a:endParaRPr lang="en-IN" sz="1400" dirty="0"/>
+                      <a:r>
+                        <a:rPr lang="en-IN" sz="1400" b="1" i="0" kern="1200" dirty="0" smtClean="0">
+                          <a:solidFill>
+                            <a:schemeClr val="dk1"/>
+                          </a:solidFill>
+                          <a:effectLst/>
+                          <a:latin typeface="+mn-lt"/>
+                          <a:ea typeface="+mn-ea"/>
+                          <a:cs typeface="+mn-cs"/>
+                        </a:rPr>
+                        <a:t>0.92400</a:t>
+                      </a:r>
+                      <a:endParaRPr lang="en-IN" sz="1400" b="1" dirty="0"/>
                     </a:p>
                   </a:txBody>
                   <a:tcPr/>
@@ -24000,6 +24024,18 @@
                     <a:lstStyle/>
                     <a:p>
                       <a:pPr algn="r"/>
+                      <a:r>
+                        <a:rPr lang="en-IN" sz="1400" b="0" i="0" kern="1200" dirty="0" smtClean="0">
+                          <a:solidFill>
+                            <a:schemeClr val="dk1"/>
+                          </a:solidFill>
+                          <a:effectLst/>
+                          <a:latin typeface="+mn-lt"/>
+                          <a:ea typeface="+mn-ea"/>
+                          <a:cs typeface="+mn-cs"/>
+                        </a:rPr>
+                        <a:t>0.90500</a:t>
+                      </a:r>
                       <a:endParaRPr lang="en-IN" sz="1400" dirty="0">
                         <a:solidFill>
                           <a:srgbClr val="FF0000"/>
@@ -24060,6 +24096,18 @@
                     <a:lstStyle/>
                     <a:p>
                       <a:pPr algn="r"/>
+                      <a:r>
+                        <a:rPr lang="en-IN" sz="1400" b="0" i="0" kern="1200" dirty="0" smtClean="0">
+                          <a:solidFill>
+                            <a:schemeClr val="dk1"/>
+                          </a:solidFill>
+                          <a:effectLst/>
+                          <a:latin typeface="+mn-lt"/>
+                          <a:ea typeface="+mn-ea"/>
+                          <a:cs typeface="+mn-cs"/>
+                        </a:rPr>
+                        <a:t>0.91800</a:t>
+                      </a:r>
                       <a:endParaRPr lang="en-IN" sz="1400" dirty="0"/>
                     </a:p>
                   </a:txBody>
@@ -24125,7 +24173,11 @@
                       </a:r>
                       <a:r>
                         <a:rPr lang="en-IN" sz="1400" baseline="0" dirty="0" smtClean="0"/>
-                        <a:t> Median</a:t>
+                        <a:t> </a:t>
+                      </a:r>
+                      <a:r>
+                        <a:rPr lang="en-IN" sz="1400" baseline="0" dirty="0" smtClean="0"/>
+                        <a:t>Mean</a:t>
                       </a:r>
                       <a:endParaRPr lang="en-IN" sz="1400" dirty="0" smtClean="0"/>
                     </a:p>
@@ -24188,6 +24240,18 @@
                     <a:lstStyle/>
                     <a:p>
                       <a:pPr algn="r"/>
+                      <a:r>
+                        <a:rPr lang="en-IN" sz="1400" b="0" i="0" kern="1200" dirty="0" smtClean="0">
+                          <a:solidFill>
+                            <a:schemeClr val="dk1"/>
+                          </a:solidFill>
+                          <a:effectLst/>
+                          <a:latin typeface="+mn-lt"/>
+                          <a:ea typeface="+mn-ea"/>
+                          <a:cs typeface="+mn-cs"/>
+                        </a:rPr>
+                        <a:t>0.89700</a:t>
+                      </a:r>
                       <a:endParaRPr lang="en-IN" sz="1400" dirty="0"/>
                     </a:p>
                   </a:txBody>
@@ -24291,6 +24355,18 @@
                     <a:lstStyle/>
                     <a:p>
                       <a:pPr algn="r"/>
+                      <a:r>
+                        <a:rPr lang="en-IN" sz="1400" b="0" i="0" kern="1200" dirty="0" smtClean="0">
+                          <a:solidFill>
+                            <a:schemeClr val="dk1"/>
+                          </a:solidFill>
+                          <a:effectLst/>
+                          <a:latin typeface="+mn-lt"/>
+                          <a:ea typeface="+mn-ea"/>
+                          <a:cs typeface="+mn-cs"/>
+                        </a:rPr>
+                        <a:t>0.89900</a:t>
+                      </a:r>
                       <a:endParaRPr lang="en-IN" sz="1400" dirty="0"/>
                     </a:p>
                   </a:txBody>
@@ -24371,6 +24447,18 @@
                     <a:lstStyle/>
                     <a:p>
                       <a:pPr algn="r"/>
+                      <a:r>
+                        <a:rPr lang="en-IN" sz="1400" b="0" i="0" kern="1200" dirty="0" smtClean="0">
+                          <a:solidFill>
+                            <a:schemeClr val="dk1"/>
+                          </a:solidFill>
+                          <a:effectLst/>
+                          <a:latin typeface="+mn-lt"/>
+                          <a:ea typeface="+mn-ea"/>
+                          <a:cs typeface="+mn-cs"/>
+                        </a:rPr>
+                        <a:t>0.85900</a:t>
+                      </a:r>
                       <a:endParaRPr lang="en-IN" sz="1400" dirty="0"/>
                     </a:p>
                   </a:txBody>
@@ -24684,11 +24772,7 @@
           <a:p>
             <a:r>
               <a:rPr lang="en-IN" dirty="0" smtClean="0"/>
-              <a:t>Replacement of missing values by Row Spectral Median values gave consistently better results across all </a:t>
-            </a:r>
-            <a:r>
-              <a:rPr lang="en-IN" dirty="0" smtClean="0"/>
-              <a:t>of our models.</a:t>
+              <a:t>Replacement of missing values by Row Spectral Median values gave consistently better results across all of our models.</a:t>
             </a:r>
           </a:p>
         </p:txBody>
@@ -25859,11 +25943,7 @@
           <a:p>
             <a:r>
               <a:rPr lang="en-IN" sz="1600" dirty="0" smtClean="0"/>
-              <a:t>Aim</a:t>
-            </a:r>
-            <a:r>
-              <a:rPr lang="en-IN" sz="1600" dirty="0" smtClean="0"/>
-              <a:t>: </a:t>
+              <a:t>Aim: </a:t>
             </a:r>
             <a:r>
               <a:rPr lang="en-IN" sz="1600" dirty="0"/>
@@ -25871,11 +25951,7 @@
             </a:r>
             <a:r>
               <a:rPr lang="en-IN" sz="1600" dirty="0" smtClean="0"/>
-              <a:t>Classify </a:t>
-            </a:r>
-            <a:r>
-              <a:rPr lang="en-IN" sz="1600" dirty="0" smtClean="0"/>
-              <a:t>the central </a:t>
+              <a:t>Classify the central </a:t>
             </a:r>
             <a:r>
               <a:rPr lang="en-IN" sz="1600" dirty="0"/>
@@ -25887,11 +25963,7 @@
             </a:r>
             <a:r>
               <a:rPr lang="en-IN" sz="1600" dirty="0"/>
-              <a:t>a multi-spectral satellite </a:t>
-            </a:r>
-            <a:r>
-              <a:rPr lang="en-IN" sz="1600" dirty="0"/>
-              <a:t>image</a:t>
+              <a:t>a multi-spectral satellite image</a:t>
             </a:r>
             <a:r>
               <a:rPr lang="en-IN" sz="1600" dirty="0" smtClean="0"/>
@@ -27311,11 +27383,7 @@
           <a:p>
             <a:r>
               <a:rPr lang="en-IN" dirty="0" smtClean="0"/>
-              <a:t>Data </a:t>
-            </a:r>
-            <a:r>
-              <a:rPr lang="en-IN" dirty="0" smtClean="0"/>
-              <a:t>Pre-processing(2)</a:t>
+              <a:t>Data Pre-processing(2)</a:t>
             </a:r>
             <a:endParaRPr lang="en-IN" dirty="0"/>
           </a:p>
@@ -27716,7 +27784,6 @@
               <a:rPr lang="en-IN" sz="2000" dirty="0" smtClean="0"/>
               <a:t>Replacement Techniques</a:t>
             </a:r>
-            <a:endParaRPr lang="en-IN" sz="2000" dirty="0" smtClean="0"/>
           </a:p>
           <a:p>
             <a:pPr lvl="1">
@@ -27725,11 +27792,7 @@
             </a:pPr>
             <a:r>
               <a:rPr lang="en-IN" sz="2000" dirty="0"/>
-              <a:t>Zeros &amp; Mid </a:t>
-            </a:r>
-            <a:r>
-              <a:rPr lang="en-IN" sz="2000" dirty="0"/>
-              <a:t> Values</a:t>
+              <a:t>Zeros &amp; Mid  Values</a:t>
             </a:r>
           </a:p>
           <a:p>
@@ -28352,11 +28415,7 @@
           <a:p>
             <a:r>
               <a:rPr lang="en-IN" dirty="0" smtClean="0"/>
-              <a:t>Satellite Image </a:t>
-            </a:r>
-            <a:r>
-              <a:rPr lang="en-IN" dirty="0" smtClean="0"/>
-              <a:t>Classification</a:t>
+              <a:t>Satellite Image Classification</a:t>
             </a:r>
             <a:endParaRPr lang="en-IN" dirty="0"/>
           </a:p>
@@ -28678,11 +28737,7 @@
           <a:p>
             <a:r>
               <a:rPr lang="en-IN" dirty="0" smtClean="0"/>
-              <a:t>Satellite Image </a:t>
-            </a:r>
-            <a:r>
-              <a:rPr lang="en-IN" dirty="0" smtClean="0"/>
-              <a:t>Classification</a:t>
+              <a:t>Satellite Image Classification</a:t>
             </a:r>
             <a:endParaRPr lang="en-IN" dirty="0"/>
           </a:p>
@@ -29982,7 +30037,7 @@
   <a:extraClrSchemeLst/>
   <a:extLst>
     <a:ext uri="{05A4C25C-085E-4340-85A3-A5531E510DB2}">
-      <thm15:themeFamily xmlns="" xmlns:thm15="http://schemas.microsoft.com/office/thememl/2012/main" name="Ion Boardroom" id="{FC33163D-4339-46B1-8EED-24C834239D99}" vid="{B8502691-933B-45FE-8764-BA278511EF27}"/>
+      <thm15:themeFamily xmlns:thm15="http://schemas.microsoft.com/office/thememl/2012/main" xmlns="" name="Ion Boardroom" id="{FC33163D-4339-46B1-8EED-24C834239D99}" vid="{B8502691-933B-45FE-8764-BA278511EF27}"/>
     </a:ext>
   </a:extLst>
 </a:theme>

</xml_diff>